<commit_message>
Added more information to slides
</commit_message>
<xml_diff>
--- a/Victoria Housing Median Price Change from 2011-2021.pptx
+++ b/Victoria Housing Median Price Change from 2011-2021.pptx
@@ -13954,13 +13954,13 @@
         </p:spPr>
         <p:txBody>
           <a:bodyPr>
-            <a:normAutofit/>
+            <a:normAutofit lnSpcReduction="10000"/>
           </a:bodyPr>
           <a:lstStyle/>
           <a:p>
             <a:r>
               <a:rPr lang="en-US" dirty="0"/>
-              <a:t>Our aim was to investigate the relationship between the median house price and the economy of Australia, in order to see if there if there is any relationship between house prices and interest rates. </a:t>
+              <a:t>Our aim was to investigate the relationship between the median house price and the economy of Australia, in order to see if there if there is any relationship, specifically between house prices and interest rates. </a:t>
             </a:r>
           </a:p>
           <a:p>
@@ -13978,11 +13978,11 @@
           <a:p>
             <a:r>
               <a:rPr lang="en-US" dirty="0"/>
-              <a:t>- Having an outcome where an individual is able to use the </a:t>
+              <a:t>- Having an outcome where an individual is able to use our </a:t>
             </a:r>
             <a:r>
               <a:rPr lang="en-AU" dirty="0"/>
-              <a:t>visualisation</a:t>
+              <a:t>visualisations</a:t>
             </a:r>
             <a:r>
               <a:rPr lang="en-US" dirty="0"/>
@@ -14311,7 +14311,7 @@
                 <a:ea typeface="+mn-ea"/>
                 <a:cs typeface="+mn-cs"/>
               </a:rPr>
-              <a:t> This included over 800 rows of property data.</a:t>
+              <a:t>This included over 800 rows of property data.</a:t>
             </a:r>
           </a:p>
           <a:p>
@@ -15644,8 +15644,27 @@
           </a:xfrm>
         </p:spPr>
         <p:txBody>
-          <a:bodyPr/>
+          <a:bodyPr>
+            <a:normAutofit/>
+          </a:bodyPr>
           <a:lstStyle/>
+          <a:p>
+            <a:r>
+              <a:rPr lang="en-US" dirty="0"/>
+              <a:t>As expected, while interest rates have been falling since the beginning of the timeframe our data looked at, house prices have been </a:t>
+            </a:r>
+            <a:r>
+              <a:rPr lang="en-US"/>
+              <a:t>steadily rising</a:t>
+            </a:r>
+            <a:endParaRPr lang="en-US" dirty="0"/>
+          </a:p>
+          <a:p>
+            <a:r>
+              <a:rPr lang="en-US" dirty="0"/>
+              <a:t>Inflation rates seem to have a stronger connection to  S&amp;P/ASX 200 data we used, however, this is tentative at best</a:t>
+            </a:r>
+          </a:p>
           <a:p>
             <a:endParaRPr lang="en-US" dirty="0"/>
           </a:p>
@@ -15677,7 +15696,7 @@
           <a:bodyPr/>
           <a:lstStyle/>
           <a:p>
-            <a:endParaRPr lang="en-US"/>
+            <a:endParaRPr lang="en-US" dirty="0"/>
           </a:p>
         </p:txBody>
       </p:sp>
@@ -15918,7 +15937,7 @@
               <a:defRPr/>
             </a:pPr>
             <a:r>
-              <a:rPr kumimoji="0" lang="en-US" b="0" i="0" u="none" strike="noStrike" kern="1200" cap="none" spc="0" normalizeH="0" baseline="0" noProof="0" dirty="0">
+              <a:rPr kumimoji="0" lang="en-US" sz="1700" b="0" i="0" u="none" strike="noStrike" kern="1200" cap="none" spc="0" normalizeH="0" baseline="0" noProof="0" dirty="0">
                 <a:ln>
                   <a:noFill/>
                 </a:ln>
@@ -15953,7 +15972,7 @@
               <a:defRPr/>
             </a:pPr>
             <a:r>
-              <a:rPr kumimoji="0" lang="en-US" b="0" i="0" u="none" strike="noStrike" kern="1200" cap="none" spc="0" normalizeH="0" baseline="0" noProof="0" dirty="0">
+              <a:rPr kumimoji="0" lang="en-US" sz="1700" b="0" i="0" u="none" strike="noStrike" kern="1200" cap="none" spc="0" normalizeH="0" baseline="0" noProof="0" dirty="0">
                 <a:ln>
                   <a:noFill/>
                 </a:ln>
@@ -15969,7 +15988,7 @@
               </a:rPr>
               <a:t>https://www.rba.gov.au/statistics/</a:t>
             </a:r>
-            <a:endParaRPr kumimoji="0" lang="en-US" b="0" i="0" u="none" strike="noStrike" kern="1200" cap="none" spc="0" normalizeH="0" baseline="0" noProof="0" dirty="0">
+            <a:endParaRPr kumimoji="0" lang="en-US" sz="1700" b="0" i="0" u="none" strike="noStrike" kern="1200" cap="none" spc="0" normalizeH="0" baseline="0" noProof="0" dirty="0">
               <a:ln>
                 <a:noFill/>
               </a:ln>
@@ -16002,7 +16021,7 @@
               <a:defRPr/>
             </a:pPr>
             <a:r>
-              <a:rPr kumimoji="0" lang="en-US" b="0" i="0" u="none" strike="noStrike" kern="1200" cap="none" spc="0" normalizeH="0" baseline="0" noProof="0" dirty="0">
+              <a:rPr kumimoji="0" lang="en-US" sz="1700" b="0" i="0" u="none" strike="noStrike" kern="1200" cap="none" spc="0" normalizeH="0" baseline="0" noProof="0" dirty="0">
                 <a:ln>
                   <a:noFill/>
                 </a:ln>
@@ -16018,7 +16037,7 @@
               </a:rPr>
               <a:t>https://www.wsj.com/market-data/quotes/index/AU/XJO/historical-prices</a:t>
             </a:r>
-            <a:endParaRPr kumimoji="0" lang="en-US" b="0" i="0" u="none" strike="noStrike" kern="1200" cap="none" spc="0" normalizeH="0" baseline="0" noProof="0" dirty="0">
+            <a:endParaRPr kumimoji="0" lang="en-US" sz="1700" b="0" i="0" u="none" strike="noStrike" kern="1200" cap="none" spc="0" normalizeH="0" baseline="0" noProof="0" dirty="0">
               <a:ln>
                 <a:noFill/>
               </a:ln>
@@ -16051,7 +16070,7 @@
               <a:defRPr/>
             </a:pPr>
             <a:r>
-              <a:rPr kumimoji="0" lang="en-AU" b="0" i="0" u="sng" strike="noStrike" kern="1200" cap="none" spc="0" normalizeH="0" baseline="0" noProof="0" dirty="0">
+              <a:rPr kumimoji="0" lang="en-AU" sz="1700" b="0" i="0" u="sng" strike="noStrike" kern="1200" cap="none" spc="0" normalizeH="0" baseline="0" noProof="0" dirty="0">
                 <a:ln>
                   <a:noFill/>
                 </a:ln>
@@ -16067,7 +16086,7 @@
               </a:rPr>
               <a:t>https://discover.data.vic.gov.au/dataset/victorian-property-sales-report-median-house-by-suburb-time-series1/historical</a:t>
             </a:r>
-            <a:endParaRPr kumimoji="0" lang="en-US" b="0" i="0" u="none" strike="noStrike" kern="1200" cap="none" spc="0" normalizeH="0" baseline="0" noProof="0" dirty="0">
+            <a:endParaRPr kumimoji="0" lang="en-US" sz="1700" b="0" i="0" u="none" strike="noStrike" kern="1200" cap="none" spc="0" normalizeH="0" baseline="0" noProof="0" dirty="0">
               <a:ln>
                 <a:noFill/>
               </a:ln>
@@ -16082,7 +16101,7 @@
             </a:endParaRPr>
           </a:p>
           <a:p>
-            <a:endParaRPr lang="en-US" dirty="0">
+            <a:endParaRPr lang="en-US" sz="1700" dirty="0">
               <a:solidFill>
                 <a:schemeClr val="bg1"/>
               </a:solidFill>

</xml_diff>

<commit_message>
Added some information and reworded some parts
</commit_message>
<xml_diff>
--- a/Victoria Housing Median Price Change from 2011-2021.pptx
+++ b/Victoria Housing Median Price Change from 2011-2021.pptx
@@ -15616,15 +15616,7 @@
           <a:p>
             <a:r>
               <a:rPr lang="en-US" dirty="0"/>
-              <a:t>Insight </a:t>
-            </a:r>
-            <a:r>
-              <a:rPr lang="en-US"/>
-              <a:t>into most </a:t>
-            </a:r>
-            <a:r>
-              <a:rPr lang="en-US" dirty="0"/>
-              <a:t>valuable suburbs to invest in</a:t>
+              <a:t>Insight into most valuable suburbs to invest in</a:t>
             </a:r>
           </a:p>
         </p:txBody>
@@ -15701,6 +15693,18 @@
         <p:txBody>
           <a:bodyPr/>
           <a:lstStyle/>
+          <a:p>
+            <a:r>
+              <a:rPr lang="en-US" dirty="0"/>
+              <a:t>Using the choropleth map, it is clear that many Melbourne suburbs are experiencing growth at the moment</a:t>
+            </a:r>
+          </a:p>
+          <a:p>
+            <a:r>
+              <a:rPr lang="en-US" dirty="0"/>
+              <a:t>Many of the areas with the highest growth rates appear to be in the northern and eastern suburbs, signaling them as great opportunities for investment based on past performance</a:t>
+            </a:r>
+          </a:p>
           <a:p>
             <a:endParaRPr lang="en-US" dirty="0"/>
           </a:p>

</xml_diff>

<commit_message>
Final slide update on my end
</commit_message>
<xml_diff>
--- a/Victoria Housing Median Price Change from 2011-2021.pptx
+++ b/Victoria Housing Median Price Change from 2011-2021.pptx
@@ -364,7 +364,7 @@
           <a:p>
             <a:fld id="{6EE7A52F-9D89-7442-A8E9-48D1527B5F6B}" type="datetimeFigureOut">
               <a:rPr lang="en-US" smtClean="0"/>
-              <a:t>11/22/2022</a:t>
+              <a:t>11/27/2022</a:t>
             </a:fld>
             <a:endParaRPr lang="en-US" dirty="0"/>
           </a:p>
@@ -2026,7 +2026,7 @@
             <a:fld id="{6FCA8E82-58CD-E045-8B98-B7A85B79B752}" type="datetime4">
               <a:rPr lang="en-US" smtClean="0"/>
               <a:pPr/>
-              <a:t>November 22, 2022</a:t>
+              <a:t>November 27, 2022</a:t>
             </a:fld>
             <a:endParaRPr lang="en-US" dirty="0">
               <a:latin typeface="+mn-lt"/>
@@ -3156,7 +3156,7 @@
             <a:fld id="{6FCA8E82-58CD-E045-8B98-B7A85B79B752}" type="datetime4">
               <a:rPr lang="en-US" smtClean="0"/>
               <a:pPr/>
-              <a:t>November 22, 2022</a:t>
+              <a:t>November 27, 2022</a:t>
             </a:fld>
             <a:endParaRPr lang="en-US" dirty="0">
               <a:latin typeface="+mn-lt"/>
@@ -4285,7 +4285,7 @@
             <a:fld id="{6FCA8E82-58CD-E045-8B98-B7A85B79B752}" type="datetime4">
               <a:rPr lang="en-US" smtClean="0"/>
               <a:pPr/>
-              <a:t>November 22, 2022</a:t>
+              <a:t>November 27, 2022</a:t>
             </a:fld>
             <a:endParaRPr lang="en-US" dirty="0">
               <a:latin typeface="+mn-lt"/>
@@ -6583,7 +6583,7 @@
             <a:fld id="{6FCA8E82-58CD-E045-8B98-B7A85B79B752}" type="datetime4">
               <a:rPr lang="en-US" smtClean="0"/>
               <a:pPr/>
-              <a:t>November 22, 2022</a:t>
+              <a:t>November 27, 2022</a:t>
             </a:fld>
             <a:endParaRPr lang="en-US" dirty="0">
               <a:latin typeface="+mn-lt"/>
@@ -7218,7 +7218,7 @@
             <a:fld id="{6FCA8E82-58CD-E045-8B98-B7A85B79B752}" type="datetime4">
               <a:rPr lang="en-US" smtClean="0"/>
               <a:pPr/>
-              <a:t>November 22, 2022</a:t>
+              <a:t>November 27, 2022</a:t>
             </a:fld>
             <a:endParaRPr lang="en-US" dirty="0">
               <a:latin typeface="+mn-lt"/>
@@ -7988,7 +7988,7 @@
             <a:fld id="{6FCA8E82-58CD-E045-8B98-B7A85B79B752}" type="datetime4">
               <a:rPr lang="en-US" smtClean="0"/>
               <a:pPr/>
-              <a:t>November 22, 2022</a:t>
+              <a:t>November 27, 2022</a:t>
             </a:fld>
             <a:endParaRPr lang="en-US" dirty="0">
               <a:latin typeface="+mn-lt"/>
@@ -8252,7 +8252,7 @@
             <a:fld id="{6FCA8E82-58CD-E045-8B98-B7A85B79B752}" type="datetime4">
               <a:rPr lang="en-US" smtClean="0"/>
               <a:pPr/>
-              <a:t>November 22, 2022</a:t>
+              <a:t>November 27, 2022</a:t>
             </a:fld>
             <a:endParaRPr lang="en-US" dirty="0">
               <a:latin typeface="+mn-lt"/>
@@ -11175,7 +11175,7 @@
             <a:fld id="{6FCA8E82-58CD-E045-8B98-B7A85B79B752}" type="datetime4">
               <a:rPr lang="en-US" smtClean="0"/>
               <a:pPr/>
-              <a:t>November 22, 2022</a:t>
+              <a:t>November 27, 2022</a:t>
             </a:fld>
             <a:endParaRPr lang="en-US" dirty="0">
               <a:latin typeface="+mn-lt"/>
@@ -12350,7 +12350,7 @@
             <a:fld id="{6FCA8E82-58CD-E045-8B98-B7A85B79B752}" type="datetime4">
               <a:rPr lang="en-US" smtClean="0"/>
               <a:pPr/>
-              <a:t>November 22, 2022</a:t>
+              <a:t>November 27, 2022</a:t>
             </a:fld>
             <a:endParaRPr lang="en-US" dirty="0">
               <a:latin typeface="+mn-lt"/>
@@ -12666,7 +12666,7 @@
             <a:fld id="{6FCA8E82-58CD-E045-8B98-B7A85B79B752}" type="datetime4">
               <a:rPr lang="en-US" smtClean="0"/>
               <a:pPr/>
-              <a:t>November 22, 2022</a:t>
+              <a:t>November 27, 2022</a:t>
             </a:fld>
             <a:endParaRPr lang="en-US" dirty="0">
               <a:latin typeface="+mn-lt"/>
@@ -14362,7 +14362,9 @@
           </a:xfrm>
         </p:spPr>
         <p:txBody>
-          <a:bodyPr/>
+          <a:bodyPr>
+            <a:normAutofit lnSpcReduction="10000"/>
+          </a:bodyPr>
           <a:lstStyle/>
           <a:p>
             <a:pPr>
@@ -14371,7 +14373,7 @@
             </a:pPr>
             <a:r>
               <a:rPr lang="en-US" dirty="0"/>
-              <a:t>Used pandas to transform the data until it was ready to be uploaded into a database</a:t>
+              <a:t>Used pandas to filter and transform the data until it was ready to be uploaded into a database</a:t>
             </a:r>
           </a:p>
           <a:p>
@@ -14381,7 +14383,7 @@
             </a:pPr>
             <a:r>
               <a:rPr lang="en-US" dirty="0"/>
-              <a:t>Chose SQL due to our familiarity with it</a:t>
+              <a:t>Chose to upload everything to SQL due to our familiarity with it</a:t>
             </a:r>
           </a:p>
           <a:p>
@@ -14391,7 +14393,15 @@
             </a:pPr>
             <a:r>
               <a:rPr lang="en-US" dirty="0"/>
-              <a:t>Used Leaflet to create a choropleth map, with suburb popups and D3 to display the data from the SQL database</a:t>
+              <a:t>Incorporated a new JavaScript library – sql.js, which converts </a:t>
+            </a:r>
+            <a:r>
+              <a:rPr lang="en-US" dirty="0" err="1"/>
+              <a:t>sql</a:t>
+            </a:r>
+            <a:r>
+              <a:rPr lang="en-US" dirty="0"/>
+              <a:t> databases into JavaScript typed arrays</a:t>
             </a:r>
           </a:p>
           <a:p>
@@ -14399,7 +14409,10 @@
               <a:buFontTx/>
               <a:buChar char="-"/>
             </a:pPr>
-            <a:endParaRPr lang="en-US" dirty="0"/>
+            <a:r>
+              <a:rPr lang="en-US" dirty="0"/>
+              <a:t>Used Leaflet to create a choropleth map, with suburb popups that, once clicked, display a more complete version of the suburb’s information on the dashboard</a:t>
+            </a:r>
           </a:p>
           <a:p>
             <a:pPr>
@@ -16924,24 +16937,6 @@
 </file>
 
 <file path=customXml/item1.xml><?xml version="1.0" encoding="utf-8"?>
-<p:properties xmlns:p="http://schemas.microsoft.com/office/2006/metadata/properties" xmlns:xsi="http://www.w3.org/2001/XMLSchema-instance" xmlns:pc="http://schemas.microsoft.com/office/infopath/2007/PartnerControls">
-  <documentManagement>
-    <Status xmlns="71af3243-3dd4-4a8d-8c0d-dd76da1f02a5">Not started</Status>
-    <MediaServiceKeyPoints xmlns="71af3243-3dd4-4a8d-8c0d-dd76da1f02a5" xsi:nil="true"/>
-  </documentManagement>
-</p:properties>
-</file>
-
-<file path=customXml/item2.xml><?xml version="1.0" encoding="utf-8"?>
-<?mso-contentType ?>
-<FormTemplates xmlns="http://schemas.microsoft.com/sharepoint/v3/contenttype/forms">
-  <Display>DocumentLibraryForm</Display>
-  <Edit>DocumentLibraryForm</Edit>
-  <New>DocumentLibraryForm</New>
-</FormTemplates>
-</file>
-
-<file path=customXml/item3.xml><?xml version="1.0" encoding="utf-8"?>
 <ct:contentTypeSchema xmlns:ct="http://schemas.microsoft.com/office/2006/metadata/contentType" xmlns:ma="http://schemas.microsoft.com/office/2006/metadata/properties/metaAttributes" ct:_="" ma:_="" ma:contentTypeName="Document" ma:contentTypeID="0x01010079F111ED35F8CC479449609E8A0923A6" ma:contentTypeVersion="12" ma:contentTypeDescription="Create a new document." ma:contentTypeScope="" ma:versionID="426e97fa315356fffbdcd9876fe988c2">
   <xsd:schema xmlns:xsd="http://www.w3.org/2001/XMLSchema" xmlns:xs="http://www.w3.org/2001/XMLSchema" xmlns:p="http://schemas.microsoft.com/office/2006/metadata/properties" xmlns:ns2="71af3243-3dd4-4a8d-8c0d-dd76da1f02a5" xmlns:ns3="16c05727-aa75-4e4a-9b5f-8a80a1165891" targetNamespace="http://schemas.microsoft.com/office/2006/metadata/properties" ma:root="true" ma:fieldsID="14b8f0def80e6d70ce3def20c90759ae" ns2:_="" ns3:_="">
     <xsd:import namespace="71af3243-3dd4-4a8d-8c0d-dd76da1f02a5"/>
@@ -17162,25 +17157,25 @@
 </ct:contentTypeSchema>
 </file>
 
-<file path=customXml/itemProps1.xml><?xml version="1.0" encoding="utf-8"?>
-<ds:datastoreItem xmlns:ds="http://schemas.openxmlformats.org/officeDocument/2006/customXml" ds:itemID="{09EC1AB0-9704-404D-B6D3-819D938AC55B}">
-  <ds:schemaRefs>
-    <ds:schemaRef ds:uri="http://schemas.microsoft.com/office/2006/metadata/properties"/>
-    <ds:schemaRef ds:uri="http://schemas.microsoft.com/office/infopath/2007/PartnerControls"/>
-    <ds:schemaRef ds:uri="71af3243-3dd4-4a8d-8c0d-dd76da1f02a5"/>
-  </ds:schemaRefs>
-</ds:datastoreItem>
+<file path=customXml/item2.xml><?xml version="1.0" encoding="utf-8"?>
+<?mso-contentType ?>
+<FormTemplates xmlns="http://schemas.microsoft.com/sharepoint/v3/contenttype/forms">
+  <Display>DocumentLibraryForm</Display>
+  <Edit>DocumentLibraryForm</Edit>
+  <New>DocumentLibraryForm</New>
+</FormTemplates>
 </file>
 
-<file path=customXml/itemProps2.xml><?xml version="1.0" encoding="utf-8"?>
-<ds:datastoreItem xmlns:ds="http://schemas.openxmlformats.org/officeDocument/2006/customXml" ds:itemID="{1D20B6E4-879E-4E6C-BDE7-261540CD3765}">
-  <ds:schemaRefs>
-    <ds:schemaRef ds:uri="http://schemas.microsoft.com/sharepoint/v3/contenttype/forms"/>
-  </ds:schemaRefs>
-</ds:datastoreItem>
+<file path=customXml/item3.xml><?xml version="1.0" encoding="utf-8"?>
+<p:properties xmlns:p="http://schemas.microsoft.com/office/2006/metadata/properties" xmlns:xsi="http://www.w3.org/2001/XMLSchema-instance" xmlns:pc="http://schemas.microsoft.com/office/infopath/2007/PartnerControls">
+  <documentManagement>
+    <Status xmlns="71af3243-3dd4-4a8d-8c0d-dd76da1f02a5">Not started</Status>
+    <MediaServiceKeyPoints xmlns="71af3243-3dd4-4a8d-8c0d-dd76da1f02a5" xsi:nil="true"/>
+  </documentManagement>
+</p:properties>
 </file>
 
-<file path=customXml/itemProps3.xml><?xml version="1.0" encoding="utf-8"?>
+<file path=customXml/itemProps1.xml><?xml version="1.0" encoding="utf-8"?>
 <ds:datastoreItem xmlns:ds="http://schemas.openxmlformats.org/officeDocument/2006/customXml" ds:itemID="{94F21D10-BD83-491A-AAA6-945C2DB1EB01}">
   <ds:schemaRefs>
     <ds:schemaRef ds:uri="http://schemas.microsoft.com/office/2006/metadata/contentType"/>
@@ -17197,4 +17192,22 @@
     <ds:schemaRef ds:uri="http://schemas.microsoft.com/internal/obd"/>
   </ds:schemaRefs>
 </ds:datastoreItem>
+</file>
+
+<file path=customXml/itemProps2.xml><?xml version="1.0" encoding="utf-8"?>
+<ds:datastoreItem xmlns:ds="http://schemas.openxmlformats.org/officeDocument/2006/customXml" ds:itemID="{1D20B6E4-879E-4E6C-BDE7-261540CD3765}">
+  <ds:schemaRefs>
+    <ds:schemaRef ds:uri="http://schemas.microsoft.com/sharepoint/v3/contenttype/forms"/>
+  </ds:schemaRefs>
+</ds:datastoreItem>
+</file>
+
+<file path=customXml/itemProps3.xml><?xml version="1.0" encoding="utf-8"?>
+<ds:datastoreItem xmlns:ds="http://schemas.openxmlformats.org/officeDocument/2006/customXml" ds:itemID="{09EC1AB0-9704-404D-B6D3-819D938AC55B}">
+  <ds:schemaRefs>
+    <ds:schemaRef ds:uri="http://schemas.microsoft.com/office/2006/metadata/properties"/>
+    <ds:schemaRef ds:uri="http://schemas.microsoft.com/office/infopath/2007/PartnerControls"/>
+    <ds:schemaRef ds:uri="71af3243-3dd4-4a8d-8c0d-dd76da1f02a5"/>
+  </ds:schemaRefs>
+</ds:datastoreItem>
 </file>
</xml_diff>